<commit_message>
style element class lecture
</commit_message>
<xml_diff>
--- a/MoreCss/CssClassSelector.pptx
+++ b/MoreCss/CssClassSelector.pptx
@@ -225,7 +225,7 @@
           <a:p>
             <a:fld id="{19104133-B5B0-4351-8158-4F0E5EB1E2BF}" type="datetimeFigureOut">
               <a:rPr lang="en-US" smtClean="0"/>
-              <a:t>9/14/2021</a:t>
+              <a:t>10/19/2022</a:t>
             </a:fld>
             <a:endParaRPr lang="en-US"/>
           </a:p>
@@ -1069,7 +1069,7 @@
             <a:fld id="{1C2D31DE-C454-491C-B5C3-F097855E3DF7}" type="datetime4">
               <a:rPr lang="en-US" smtClean="0"/>
               <a:pPr/>
-              <a:t>September 14, 2021</a:t>
+              <a:t>October 19, 2022</a:t>
             </a:fld>
             <a:endParaRPr lang="en-US" dirty="0"/>
           </a:p>
@@ -4461,7 +4461,7 @@
           <a:p>
             <a:fld id="{5958763E-B898-436D-883D-03711491D54A}" type="datetimeFigureOut">
               <a:rPr lang="en-US" smtClean="0"/>
-              <a:t>9/14/2021</a:t>
+              <a:t>10/19/2022</a:t>
             </a:fld>
             <a:endParaRPr lang="en-US"/>
           </a:p>
@@ -4654,7 +4654,7 @@
           <a:p>
             <a:fld id="{5958763E-B898-436D-883D-03711491D54A}" type="datetimeFigureOut">
               <a:rPr lang="en-US" smtClean="0"/>
-              <a:t>9/14/2021</a:t>
+              <a:t>10/19/2022</a:t>
             </a:fld>
             <a:endParaRPr lang="en-US"/>
           </a:p>
@@ -4904,7 +4904,7 @@
           <a:p>
             <a:fld id="{5958763E-B898-436D-883D-03711491D54A}" type="datetimeFigureOut">
               <a:rPr lang="en-US" smtClean="0"/>
-              <a:t>9/14/2021</a:t>
+              <a:t>10/19/2022</a:t>
             </a:fld>
             <a:endParaRPr lang="en-US"/>
           </a:p>
@@ -5252,7 +5252,7 @@
           <a:p>
             <a:fld id="{5958763E-B898-436D-883D-03711491D54A}" type="datetimeFigureOut">
               <a:rPr lang="en-US" smtClean="0"/>
-              <a:t>9/14/2021</a:t>
+              <a:t>10/19/2022</a:t>
             </a:fld>
             <a:endParaRPr lang="en-US"/>
           </a:p>
@@ -5668,7 +5668,7 @@
           <a:p>
             <a:fld id="{5958763E-B898-436D-883D-03711491D54A}" type="datetimeFigureOut">
               <a:rPr lang="en-US" smtClean="0"/>
-              <a:t>9/14/2021</a:t>
+              <a:t>10/19/2022</a:t>
             </a:fld>
             <a:endParaRPr lang="en-US"/>
           </a:p>
@@ -6169,7 +6169,7 @@
           <a:p>
             <a:fld id="{5958763E-B898-436D-883D-03711491D54A}" type="datetimeFigureOut">
               <a:rPr lang="en-US" smtClean="0"/>
-              <a:t>9/14/2021</a:t>
+              <a:t>10/19/2022</a:t>
             </a:fld>
             <a:endParaRPr lang="en-US"/>
           </a:p>
@@ -6620,7 +6620,7 @@
           <a:p>
             <a:fld id="{5958763E-B898-436D-883D-03711491D54A}" type="datetimeFigureOut">
               <a:rPr lang="en-US" smtClean="0"/>
-              <a:t>9/14/2021</a:t>
+              <a:t>10/19/2022</a:t>
             </a:fld>
             <a:endParaRPr lang="en-US"/>
           </a:p>
@@ -7231,7 +7231,7 @@
           <a:p>
             <a:fld id="{5958763E-B898-436D-883D-03711491D54A}" type="datetimeFigureOut">
               <a:rPr lang="en-US" smtClean="0"/>
-              <a:t>9/14/2021</a:t>
+              <a:t>10/19/2022</a:t>
             </a:fld>
             <a:endParaRPr lang="en-US"/>
           </a:p>
@@ -8002,7 +8002,7 @@
           <a:p>
             <a:fld id="{5958763E-B898-436D-883D-03711491D54A}" type="datetimeFigureOut">
               <a:rPr lang="en-US" smtClean="0"/>
-              <a:t>9/14/2021</a:t>
+              <a:t>10/19/2022</a:t>
             </a:fld>
             <a:endParaRPr lang="en-US"/>
           </a:p>
@@ -8106,7 +8106,7 @@
           <a:p>
             <a:fld id="{5958763E-B898-436D-883D-03711491D54A}" type="datetimeFigureOut">
               <a:rPr lang="en-US" smtClean="0"/>
-              <a:t>9/14/2021</a:t>
+              <a:t>10/19/2022</a:t>
             </a:fld>
             <a:endParaRPr lang="en-US"/>
           </a:p>
@@ -8433,7 +8433,7 @@
             <a:fld id="{1C2D31DE-C454-491C-B5C3-F097855E3DF7}" type="datetime4">
               <a:rPr lang="en-US" smtClean="0"/>
               <a:pPr/>
-              <a:t>September 14, 2021</a:t>
+              <a:t>October 19, 2022</a:t>
             </a:fld>
             <a:endParaRPr lang="en-US" dirty="0"/>
           </a:p>
@@ -11585,7 +11585,7 @@
           <a:p>
             <a:fld id="{5958763E-B898-436D-883D-03711491D54A}" type="datetimeFigureOut">
               <a:rPr lang="en-US" smtClean="0"/>
-              <a:t>9/14/2021</a:t>
+              <a:t>10/19/2022</a:t>
             </a:fld>
             <a:endParaRPr lang="en-US"/>
           </a:p>
@@ -11709,7 +11709,7 @@
           <a:p>
             <a:fld id="{5958763E-B898-436D-883D-03711491D54A}" type="datetimeFigureOut">
               <a:rPr lang="en-US" smtClean="0"/>
-              <a:t>9/14/2021</a:t>
+              <a:t>10/19/2022</a:t>
             </a:fld>
             <a:endParaRPr lang="en-US"/>
           </a:p>
@@ -11833,7 +11833,7 @@
           <a:p>
             <a:fld id="{5958763E-B898-436D-883D-03711491D54A}" type="datetimeFigureOut">
               <a:rPr lang="en-US" smtClean="0"/>
-              <a:t>9/14/2021</a:t>
+              <a:t>10/19/2022</a:t>
             </a:fld>
             <a:endParaRPr lang="en-US"/>
           </a:p>
@@ -11957,7 +11957,7 @@
           <a:p>
             <a:fld id="{5958763E-B898-436D-883D-03711491D54A}" type="datetimeFigureOut">
               <a:rPr lang="en-US" smtClean="0"/>
-              <a:t>9/14/2021</a:t>
+              <a:t>10/19/2022</a:t>
             </a:fld>
             <a:endParaRPr lang="en-US"/>
           </a:p>
@@ -12081,7 +12081,7 @@
           <a:p>
             <a:fld id="{5958763E-B898-436D-883D-03711491D54A}" type="datetimeFigureOut">
               <a:rPr lang="en-US" smtClean="0"/>
-              <a:t>9/14/2021</a:t>
+              <a:t>10/19/2022</a:t>
             </a:fld>
             <a:endParaRPr lang="en-US"/>
           </a:p>
@@ -12205,7 +12205,7 @@
           <a:p>
             <a:fld id="{5958763E-B898-436D-883D-03711491D54A}" type="datetimeFigureOut">
               <a:rPr lang="en-US" smtClean="0"/>
-              <a:t>9/14/2021</a:t>
+              <a:t>10/19/2022</a:t>
             </a:fld>
             <a:endParaRPr lang="en-US"/>
           </a:p>
@@ -12329,7 +12329,7 @@
           <a:p>
             <a:fld id="{5958763E-B898-436D-883D-03711491D54A}" type="datetimeFigureOut">
               <a:rPr lang="en-US" smtClean="0"/>
-              <a:t>9/14/2021</a:t>
+              <a:t>10/19/2022</a:t>
             </a:fld>
             <a:endParaRPr lang="en-US"/>
           </a:p>
@@ -12453,7 +12453,7 @@
           <a:p>
             <a:fld id="{5958763E-B898-436D-883D-03711491D54A}" type="datetimeFigureOut">
               <a:rPr lang="en-US" smtClean="0"/>
-              <a:t>9/14/2021</a:t>
+              <a:t>10/19/2022</a:t>
             </a:fld>
             <a:endParaRPr lang="en-US"/>
           </a:p>
@@ -12586,7 +12586,7 @@
           <a:p>
             <a:fld id="{5958763E-B898-436D-883D-03711491D54A}" type="datetimeFigureOut">
               <a:rPr lang="en-US" smtClean="0"/>
-              <a:t>9/14/2021</a:t>
+              <a:t>10/19/2022</a:t>
             </a:fld>
             <a:endParaRPr lang="en-US"/>
           </a:p>
@@ -15925,7 +15925,7 @@
             <a:fld id="{1C2D31DE-C454-491C-B5C3-F097855E3DF7}" type="datetime4">
               <a:rPr lang="en-US" smtClean="0"/>
               <a:pPr/>
-              <a:t>September 14, 2021</a:t>
+              <a:t>October 19, 2022</a:t>
             </a:fld>
             <a:endParaRPr lang="en-US" dirty="0"/>
           </a:p>
@@ -28161,7 +28161,7 @@
           <a:p>
             <a:fld id="{5958763E-B898-436D-883D-03711491D54A}" type="datetimeFigureOut">
               <a:rPr lang="en-US" smtClean="0"/>
-              <a:t>9/14/2021</a:t>
+              <a:t>10/19/2022</a:t>
             </a:fld>
             <a:endParaRPr lang="en-US"/>
           </a:p>
@@ -28563,7 +28563,7 @@
           <a:p>
             <a:fld id="{5958763E-B898-436D-883D-03711491D54A}" type="datetimeFigureOut">
               <a:rPr lang="en-US" smtClean="0"/>
-              <a:t>9/14/2021</a:t>
+              <a:t>10/19/2022</a:t>
             </a:fld>
             <a:endParaRPr lang="en-US"/>
           </a:p>
@@ -28857,7 +28857,7 @@
           <a:p>
             <a:fld id="{5958763E-B898-436D-883D-03711491D54A}" type="datetimeFigureOut">
               <a:rPr lang="en-US" smtClean="0"/>
-              <a:t>9/14/2021</a:t>
+              <a:t>10/19/2022</a:t>
             </a:fld>
             <a:endParaRPr lang="en-US"/>
           </a:p>
@@ -29058,7 +29058,7 @@
           <a:p>
             <a:fld id="{5958763E-B898-436D-883D-03711491D54A}" type="datetimeFigureOut">
               <a:rPr lang="en-US" smtClean="0"/>
-              <a:t>9/14/2021</a:t>
+              <a:t>10/19/2022</a:t>
             </a:fld>
             <a:endParaRPr lang="en-US"/>
           </a:p>
@@ -29319,7 +29319,7 @@
           <a:p>
             <a:fld id="{5958763E-B898-436D-883D-03711491D54A}" type="datetimeFigureOut">
               <a:rPr lang="en-US" smtClean="0"/>
-              <a:t>9/14/2021</a:t>
+              <a:t>10/19/2022</a:t>
             </a:fld>
             <a:endParaRPr lang="en-US"/>
           </a:p>
@@ -29827,7 +29827,7 @@
           <a:p>
             <a:fld id="{5958763E-B898-436D-883D-03711491D54A}" type="datetimeFigureOut">
               <a:rPr lang="en-US" smtClean="0"/>
-              <a:t>9/14/2021</a:t>
+              <a:t>10/19/2022</a:t>
             </a:fld>
             <a:endParaRPr lang="en-US"/>
           </a:p>
@@ -30306,7 +30306,7 @@
           <a:p>
             <a:fld id="{5958763E-B898-436D-883D-03711491D54A}" type="datetimeFigureOut">
               <a:rPr lang="en-US" smtClean="0"/>
-              <a:t>9/14/2021</a:t>
+              <a:t>10/19/2022</a:t>
             </a:fld>
             <a:endParaRPr lang="en-US"/>
           </a:p>
@@ -31125,7 +31125,7 @@
           <a:p>
             <a:fld id="{5958763E-B898-436D-883D-03711491D54A}" type="datetimeFigureOut">
               <a:rPr lang="en-US" smtClean="0"/>
-              <a:t>9/14/2021</a:t>
+              <a:t>10/19/2022</a:t>
             </a:fld>
             <a:endParaRPr lang="en-US"/>
           </a:p>
@@ -31326,7 +31326,7 @@
           <a:p>
             <a:fld id="{5958763E-B898-436D-883D-03711491D54A}" type="datetimeFigureOut">
               <a:rPr lang="en-US" smtClean="0"/>
-              <a:t>9/14/2021</a:t>
+              <a:t>10/19/2022</a:t>
             </a:fld>
             <a:endParaRPr lang="en-US"/>
           </a:p>
@@ -31661,7 +31661,7 @@
           <a:p>
             <a:fld id="{5958763E-B898-436D-883D-03711491D54A}" type="datetimeFigureOut">
               <a:rPr lang="en-US" smtClean="0"/>
-              <a:t>9/14/2021</a:t>
+              <a:t>10/19/2022</a:t>
             </a:fld>
             <a:endParaRPr lang="en-US"/>
           </a:p>
@@ -31891,7 +31891,7 @@
           <a:p>
             <a:fld id="{5958763E-B898-436D-883D-03711491D54A}" type="datetimeFigureOut">
               <a:rPr lang="en-US" smtClean="0"/>
-              <a:t>9/14/2021</a:t>
+              <a:t>10/19/2022</a:t>
             </a:fld>
             <a:endParaRPr lang="en-US"/>
           </a:p>
@@ -32135,7 +32135,7 @@
           <a:p>
             <a:fld id="{5958763E-B898-436D-883D-03711491D54A}" type="datetimeFigureOut">
               <a:rPr lang="en-US" smtClean="0"/>
-              <a:t>9/14/2021</a:t>
+              <a:t>10/19/2022</a:t>
             </a:fld>
             <a:endParaRPr lang="en-US"/>
           </a:p>
@@ -37222,7 +37222,7 @@
               <a:rPr lang="en-US" sz="9600" dirty="0">
                 <a:hlinkClick r:id="rId3"/>
               </a:rPr>
-              <a:t>https://replit.com/@HylandOutreach/CssClassExample</a:t>
+              <a:t>https://replit.com/@HylandOutreach/CssClasses</a:t>
             </a:r>
             <a:endParaRPr lang="en-US" sz="9600" dirty="0"/>
           </a:p>

</xml_diff>